<commit_message>
update schema and seed
</commit_message>
<xml_diff>
--- a/docs/infra_architecture.pptx
+++ b/docs/infra_architecture.pptx
@@ -262,7 +262,7 @@
           <a:p>
             <a:fld id="{6689A1F0-9058-4557-9352-BCF9D8DCD182}" type="datetimeFigureOut">
               <a:rPr kumimoji="1" lang="ja-JP" altLang="en-US" smtClean="0"/>
-              <a:t>2023/5/25</a:t>
+              <a:t>2023/6/1</a:t>
             </a:fld>
             <a:endParaRPr kumimoji="1" lang="ja-JP" altLang="en-US"/>
           </a:p>
@@ -492,7 +492,7 @@
           <a:p>
             <a:fld id="{6689A1F0-9058-4557-9352-BCF9D8DCD182}" type="datetimeFigureOut">
               <a:rPr kumimoji="1" lang="ja-JP" altLang="en-US" smtClean="0"/>
-              <a:t>2023/5/25</a:t>
+              <a:t>2023/6/1</a:t>
             </a:fld>
             <a:endParaRPr kumimoji="1" lang="ja-JP" altLang="en-US"/>
           </a:p>
@@ -732,7 +732,7 @@
           <a:p>
             <a:fld id="{6689A1F0-9058-4557-9352-BCF9D8DCD182}" type="datetimeFigureOut">
               <a:rPr kumimoji="1" lang="ja-JP" altLang="en-US" smtClean="0"/>
-              <a:t>2023/5/25</a:t>
+              <a:t>2023/6/1</a:t>
             </a:fld>
             <a:endParaRPr kumimoji="1" lang="ja-JP" altLang="en-US"/>
           </a:p>
@@ -962,7 +962,7 @@
           <a:p>
             <a:fld id="{6689A1F0-9058-4557-9352-BCF9D8DCD182}" type="datetimeFigureOut">
               <a:rPr kumimoji="1" lang="ja-JP" altLang="en-US" smtClean="0"/>
-              <a:t>2023/5/25</a:t>
+              <a:t>2023/6/1</a:t>
             </a:fld>
             <a:endParaRPr kumimoji="1" lang="ja-JP" altLang="en-US"/>
           </a:p>
@@ -1237,7 +1237,7 @@
           <a:p>
             <a:fld id="{6689A1F0-9058-4557-9352-BCF9D8DCD182}" type="datetimeFigureOut">
               <a:rPr kumimoji="1" lang="ja-JP" altLang="en-US" smtClean="0"/>
-              <a:t>2023/5/25</a:t>
+              <a:t>2023/6/1</a:t>
             </a:fld>
             <a:endParaRPr kumimoji="1" lang="ja-JP" altLang="en-US"/>
           </a:p>
@@ -1566,7 +1566,7 @@
           <a:p>
             <a:fld id="{6689A1F0-9058-4557-9352-BCF9D8DCD182}" type="datetimeFigureOut">
               <a:rPr kumimoji="1" lang="ja-JP" altLang="en-US" smtClean="0"/>
-              <a:t>2023/5/25</a:t>
+              <a:t>2023/6/1</a:t>
             </a:fld>
             <a:endParaRPr kumimoji="1" lang="ja-JP" altLang="en-US"/>
           </a:p>
@@ -2042,7 +2042,7 @@
           <a:p>
             <a:fld id="{6689A1F0-9058-4557-9352-BCF9D8DCD182}" type="datetimeFigureOut">
               <a:rPr kumimoji="1" lang="ja-JP" altLang="en-US" smtClean="0"/>
-              <a:t>2023/5/25</a:t>
+              <a:t>2023/6/1</a:t>
             </a:fld>
             <a:endParaRPr kumimoji="1" lang="ja-JP" altLang="en-US"/>
           </a:p>
@@ -2183,7 +2183,7 @@
           <a:p>
             <a:fld id="{6689A1F0-9058-4557-9352-BCF9D8DCD182}" type="datetimeFigureOut">
               <a:rPr kumimoji="1" lang="ja-JP" altLang="en-US" smtClean="0"/>
-              <a:t>2023/5/25</a:t>
+              <a:t>2023/6/1</a:t>
             </a:fld>
             <a:endParaRPr kumimoji="1" lang="ja-JP" altLang="en-US"/>
           </a:p>
@@ -2296,7 +2296,7 @@
           <a:p>
             <a:fld id="{6689A1F0-9058-4557-9352-BCF9D8DCD182}" type="datetimeFigureOut">
               <a:rPr kumimoji="1" lang="ja-JP" altLang="en-US" smtClean="0"/>
-              <a:t>2023/5/25</a:t>
+              <a:t>2023/6/1</a:t>
             </a:fld>
             <a:endParaRPr kumimoji="1" lang="ja-JP" altLang="en-US"/>
           </a:p>
@@ -2639,7 +2639,7 @@
           <a:p>
             <a:fld id="{6689A1F0-9058-4557-9352-BCF9D8DCD182}" type="datetimeFigureOut">
               <a:rPr kumimoji="1" lang="ja-JP" altLang="en-US" smtClean="0"/>
-              <a:t>2023/5/25</a:t>
+              <a:t>2023/6/1</a:t>
             </a:fld>
             <a:endParaRPr kumimoji="1" lang="ja-JP" altLang="en-US"/>
           </a:p>
@@ -2927,7 +2927,7 @@
           <a:p>
             <a:fld id="{6689A1F0-9058-4557-9352-BCF9D8DCD182}" type="datetimeFigureOut">
               <a:rPr kumimoji="1" lang="ja-JP" altLang="en-US" smtClean="0"/>
-              <a:t>2023/5/25</a:t>
+              <a:t>2023/6/1</a:t>
             </a:fld>
             <a:endParaRPr kumimoji="1" lang="ja-JP" altLang="en-US"/>
           </a:p>
@@ -3200,7 +3200,7 @@
           <a:p>
             <a:fld id="{6689A1F0-9058-4557-9352-BCF9D8DCD182}" type="datetimeFigureOut">
               <a:rPr kumimoji="1" lang="ja-JP" altLang="en-US" smtClean="0"/>
-              <a:t>2023/5/25</a:t>
+              <a:t>2023/6/1</a:t>
             </a:fld>
             <a:endParaRPr kumimoji="1" lang="ja-JP" altLang="en-US"/>
           </a:p>
@@ -7800,18 +7800,18 @@
           <p:cNvCxnSpPr>
             <a:cxnSpLocks/>
             <a:stCxn id="6" idx="0"/>
-            <a:endCxn id="2" idx="0"/>
+            <a:endCxn id="7" idx="0"/>
           </p:cNvCxnSpPr>
           <p:nvPr/>
         </p:nvCxnSpPr>
         <p:spPr>
-          <a:xfrm rot="5400000" flipH="1" flipV="1">
-            <a:off x="5552883" y="-1124701"/>
-            <a:ext cx="1" cy="6783140"/>
+          <a:xfrm rot="16200000" flipH="1">
+            <a:off x="4459912" y="-31731"/>
+            <a:ext cx="8839" cy="4606039"/>
           </a:xfrm>
           <a:prstGeom prst="bentConnector3">
             <a:avLst>
-              <a:gd name="adj1" fmla="val 22860100000"/>
+              <a:gd name="adj1" fmla="val -2586265"/>
             </a:avLst>
           </a:prstGeom>
           <a:ln w="19050">
@@ -7850,7 +7850,7 @@
         </p:nvSpPr>
         <p:spPr>
           <a:xfrm>
-            <a:off x="4995916" y="1788687"/>
+            <a:off x="3610600" y="1769554"/>
             <a:ext cx="1713931" cy="276999"/>
           </a:xfrm>
           <a:prstGeom prst="rect">

</xml_diff>